<commit_message>
Update with discussion notes
</commit_message>
<xml_diff>
--- a/TA2/lmcp-message-format/Build Interfaces.pptx
+++ b/TA2/lmcp-message-format/Build Interfaces.pptx
@@ -5656,6 +5656,52 @@
       </p:grpSpPr>
       <p:sp>
         <p:nvSpPr>
+          <p:cNvPr id="2" name="Rounded Rectangle 1">
+            <a:extLst>
+              <a:ext uri="{FF2B5EF4-FFF2-40B4-BE49-F238E27FC236}">
+                <a16:creationId xmlns:a16="http://schemas.microsoft.com/office/drawing/2014/main" id="{9573E54B-2C9A-6045-966D-720156A5962E}"/>
+              </a:ext>
+            </a:extLst>
+          </p:cNvPr>
+          <p:cNvSpPr/>
+          <p:nvPr/>
+        </p:nvSpPr>
+        <p:spPr>
+          <a:xfrm>
+            <a:off x="3738350" y="1250209"/>
+            <a:ext cx="5235050" cy="2676107"/>
+          </a:xfrm>
+          <a:prstGeom prst="roundRect">
+            <a:avLst/>
+          </a:prstGeom>
+        </p:spPr>
+        <p:style>
+          <a:lnRef idx="2">
+            <a:schemeClr val="accent1">
+              <a:shade val="50000"/>
+            </a:schemeClr>
+          </a:lnRef>
+          <a:fillRef idx="1">
+            <a:schemeClr val="accent1"/>
+          </a:fillRef>
+          <a:effectRef idx="0">
+            <a:schemeClr val="accent1"/>
+          </a:effectRef>
+          <a:fontRef idx="minor">
+            <a:schemeClr val="lt1"/>
+          </a:fontRef>
+        </p:style>
+        <p:txBody>
+          <a:bodyPr rtlCol="0" anchor="ctr"/>
+          <a:lstStyle/>
+          <a:p>
+            <a:pPr algn="ctr"/>
+            <a:endParaRPr lang="en-US"/>
+          </a:p>
+        </p:txBody>
+      </p:sp>
+      <p:sp>
+        <p:nvSpPr>
           <p:cNvPr id="54" name="Google Shape;54;p13"/>
           <p:cNvSpPr/>
           <p:nvPr/>
@@ -5714,7 +5760,7 @@
         </p:nvSpPr>
         <p:spPr>
           <a:xfrm>
-            <a:off x="2571850" y="2049425"/>
+            <a:off x="2520469" y="2049425"/>
             <a:ext cx="1184700" cy="374700"/>
           </a:xfrm>
           <a:prstGeom prst="rightArrow">
@@ -5752,10 +5798,18 @@
               <a:buNone/>
             </a:pPr>
             <a:r>
-              <a:rPr lang="en"/>
-              <a:t> (t, lmcp)</a:t>
+              <a:rPr lang="en" dirty="0"/>
+              <a:t> (t, </a:t>
             </a:r>
-            <a:endParaRPr/>
+            <a:r>
+              <a:rPr lang="en" dirty="0" err="1"/>
+              <a:t>bArr</a:t>
+            </a:r>
+            <a:r>
+              <a:rPr lang="en" dirty="0"/>
+              <a:t>)</a:t>
+            </a:r>
+            <a:endParaRPr dirty="0"/>
           </a:p>
         </p:txBody>
       </p:sp>
@@ -5804,10 +5858,10 @@
               <a:buNone/>
             </a:pPr>
             <a:r>
-              <a:rPr lang="en"/>
-              <a:t>Type II</a:t>
+              <a:rPr lang="en" dirty="0"/>
+              <a:t>Type IV</a:t>
             </a:r>
-            <a:endParaRPr/>
+            <a:endParaRPr dirty="0"/>
           </a:p>
         </p:txBody>
       </p:sp>
@@ -5856,11 +5910,7 @@
               </a:spcAft>
               <a:buNone/>
             </a:pPr>
-            <a:r>
-              <a:rPr lang="en"/>
-              <a:t>transport</a:t>
-            </a:r>
-            <a:endParaRPr/>
+            <a:endParaRPr dirty="0"/>
           </a:p>
         </p:txBody>
       </p:sp>
@@ -5872,7 +5922,7 @@
         </p:nvSpPr>
         <p:spPr>
           <a:xfrm>
-            <a:off x="2521850" y="1675275"/>
+            <a:off x="2470469" y="1675275"/>
             <a:ext cx="1184700" cy="342300"/>
           </a:xfrm>
           <a:prstGeom prst="leftArrow">
@@ -5959,77 +6009,6 @@
           </a:p>
         </p:txBody>
       </p:sp>
-      <p:sp>
-        <p:nvSpPr>
-          <p:cNvPr id="60" name="Google Shape;60;p13"/>
-          <p:cNvSpPr txBox="1"/>
-          <p:nvPr/>
-        </p:nvSpPr>
-        <p:spPr>
-          <a:xfrm>
-            <a:off x="828750" y="83725"/>
-            <a:ext cx="2301300" cy="959700"/>
-          </a:xfrm>
-          <a:prstGeom prst="rect">
-            <a:avLst/>
-          </a:prstGeom>
-          <a:noFill/>
-          <a:ln>
-            <a:noFill/>
-          </a:ln>
-        </p:spPr>
-        <p:txBody>
-          <a:bodyPr spcFirstLastPara="1" wrap="square" lIns="91425" tIns="91425" rIns="91425" bIns="91425" anchor="t" anchorCtr="0">
-            <a:noAutofit/>
-          </a:bodyPr>
-          <a:lstStyle/>
-          <a:p>
-            <a:pPr marL="0" lvl="0" indent="0" algn="l" rtl="0">
-              <a:spcBef>
-                <a:spcPts val="0"/>
-              </a:spcBef>
-              <a:spcAft>
-                <a:spcPts val="0"/>
-              </a:spcAft>
-              <a:buNone/>
-            </a:pPr>
-            <a:r>
-              <a:rPr lang="en"/>
-              <a:t>Manages the transport layer with the address and attributes of the message as well as the time stamp</a:t>
-            </a:r>
-            <a:endParaRPr/>
-          </a:p>
-        </p:txBody>
-      </p:sp>
-      <p:cxnSp>
-        <p:nvCxnSpPr>
-          <p:cNvPr id="61" name="Google Shape;61;p13"/>
-          <p:cNvCxnSpPr>
-            <a:stCxn id="60" idx="2"/>
-            <a:endCxn id="54" idx="0"/>
-          </p:cNvCxnSpPr>
-          <p:nvPr/>
-        </p:nvCxnSpPr>
-        <p:spPr>
-          <a:xfrm>
-            <a:off x="1979400" y="1043425"/>
-            <a:ext cx="0" cy="342300"/>
-          </a:xfrm>
-          <a:prstGeom prst="straightConnector1">
-            <a:avLst/>
-          </a:prstGeom>
-          <a:noFill/>
-          <a:ln w="9525" cap="flat" cmpd="sng">
-            <a:solidFill>
-              <a:schemeClr val="dk2"/>
-            </a:solidFill>
-            <a:prstDash val="solid"/>
-            <a:round/>
-            <a:headEnd type="none" w="med" len="med"/>
-            <a:tailEnd type="triangle" w="med" len="med"/>
-          </a:ln>
-        </p:spPr>
-      </p:cxnSp>
       <p:cxnSp>
         <p:nvCxnSpPr>
           <p:cNvPr id="62" name="Google Shape;62;p13"/>
@@ -6061,83 +6040,13 @@
       </p:cxnSp>
       <p:sp>
         <p:nvSpPr>
-          <p:cNvPr id="63" name="Google Shape;63;p13"/>
-          <p:cNvSpPr txBox="1"/>
-          <p:nvPr/>
-        </p:nvSpPr>
-        <p:spPr>
-          <a:xfrm>
-            <a:off x="-29500" y="4102925"/>
-            <a:ext cx="1753200" cy="794400"/>
-          </a:xfrm>
-          <a:prstGeom prst="rect">
-            <a:avLst/>
-          </a:prstGeom>
-          <a:noFill/>
-          <a:ln>
-            <a:noFill/>
-          </a:ln>
-        </p:spPr>
-        <p:txBody>
-          <a:bodyPr spcFirstLastPara="1" wrap="square" lIns="91425" tIns="91425" rIns="91425" bIns="91425" anchor="t" anchorCtr="0">
-            <a:noAutofit/>
-          </a:bodyPr>
-          <a:lstStyle/>
-          <a:p>
-            <a:pPr marL="0" lvl="0" indent="0" algn="l" rtl="0">
-              <a:spcBef>
-                <a:spcPts val="0"/>
-              </a:spcBef>
-              <a:spcAft>
-                <a:spcPts val="0"/>
-              </a:spcAft>
-              <a:buNone/>
-            </a:pPr>
-            <a:r>
-              <a:rPr lang="en"/>
-              <a:t>Address-Attributed transport messages</a:t>
-            </a:r>
-            <a:endParaRPr/>
-          </a:p>
-        </p:txBody>
-      </p:sp>
-      <p:cxnSp>
-        <p:nvCxnSpPr>
-          <p:cNvPr id="64" name="Google Shape;64;p13"/>
-          <p:cNvCxnSpPr>
-            <a:stCxn id="63" idx="0"/>
-          </p:cNvCxnSpPr>
-          <p:nvPr/>
-        </p:nvCxnSpPr>
-        <p:spPr>
-          <a:xfrm rot="10800000" flipH="1">
-            <a:off x="847100" y="2907125"/>
-            <a:ext cx="17100" cy="1195800"/>
-          </a:xfrm>
-          <a:prstGeom prst="straightConnector1">
-            <a:avLst/>
-          </a:prstGeom>
-          <a:noFill/>
-          <a:ln w="9525" cap="flat" cmpd="sng">
-            <a:solidFill>
-              <a:schemeClr val="dk2"/>
-            </a:solidFill>
-            <a:prstDash val="solid"/>
-            <a:round/>
-            <a:headEnd type="none" w="med" len="med"/>
-            <a:tailEnd type="triangle" w="med" len="med"/>
-          </a:ln>
-        </p:spPr>
-      </p:cxnSp>
-      <p:sp>
-        <p:nvSpPr>
           <p:cNvPr id="65" name="Google Shape;65;p13"/>
           <p:cNvSpPr/>
           <p:nvPr/>
         </p:nvSpPr>
         <p:spPr>
           <a:xfrm>
-            <a:off x="2503550" y="1640850"/>
+            <a:off x="2452169" y="1640850"/>
             <a:ext cx="1253100" cy="794400"/>
           </a:xfrm>
           <a:prstGeom prst="rect">
@@ -6181,7 +6090,7 @@
         </p:nvSpPr>
         <p:spPr>
           <a:xfrm>
-            <a:off x="2503550" y="2949525"/>
+            <a:off x="2452169" y="2949525"/>
             <a:ext cx="1184700" cy="374700"/>
           </a:xfrm>
           <a:prstGeom prst="leftArrow">
@@ -6219,10 +6128,18 @@
               <a:buNone/>
             </a:pPr>
             <a:r>
-              <a:rPr lang="en"/>
-              <a:t>(port,lmcp)</a:t>
+              <a:rPr lang="en" dirty="0"/>
+              <a:t>(port, </a:t>
             </a:r>
-            <a:endParaRPr/>
+            <a:r>
+              <a:rPr lang="en" dirty="0" err="1"/>
+              <a:t>bArr</a:t>
+            </a:r>
+            <a:r>
+              <a:rPr lang="en" dirty="0"/>
+              <a:t>)</a:t>
+            </a:r>
+            <a:endParaRPr dirty="0"/>
           </a:p>
         </p:txBody>
       </p:sp>
@@ -6276,7 +6193,7 @@
         </p:nvSpPr>
         <p:spPr>
           <a:xfrm>
-            <a:off x="2860900" y="2713600"/>
+            <a:off x="2853150" y="2741694"/>
             <a:ext cx="606600" cy="374700"/>
           </a:xfrm>
           <a:prstGeom prst="rect">
@@ -6355,8 +6272,8 @@
               <a:buNone/>
             </a:pPr>
             <a:r>
-              <a:rPr lang="en"/>
-              <a:t>SPLATMON</a:t>
+              <a:rPr lang="en" dirty="0"/>
+              <a:t>DFA</a:t>
             </a:r>
             <a:endParaRPr dirty="0"/>
           </a:p>
@@ -6529,11 +6446,11 @@
             </a:pPr>
             <a:r>
               <a:rPr lang="en" dirty="0"/>
-              <a:t> (</a:t>
+              <a:t> (id, </a:t>
             </a:r>
             <a:r>
               <a:rPr lang="en" dirty="0" err="1"/>
-              <a:t>port,lmcp</a:t>
+              <a:t>bArr</a:t>
             </a:r>
             <a:r>
               <a:rPr lang="en" dirty="0"/>
@@ -6590,11 +6507,11 @@
             </a:pPr>
             <a:r>
               <a:rPr lang="en" dirty="0"/>
-              <a:t>(</a:t>
+              <a:t>(id, </a:t>
             </a:r>
             <a:r>
               <a:rPr lang="en" dirty="0" err="1"/>
-              <a:t>port,lmcp</a:t>
+              <a:t>bArr</a:t>
             </a:r>
             <a:r>
               <a:rPr lang="en" dirty="0"/>
@@ -6650,55 +6567,13 @@
       </p:sp>
       <p:sp>
         <p:nvSpPr>
-          <p:cNvPr id="73" name="Google Shape;73;p13"/>
-          <p:cNvSpPr txBox="1"/>
-          <p:nvPr/>
-        </p:nvSpPr>
-        <p:spPr>
-          <a:xfrm>
-            <a:off x="4970625" y="1839425"/>
-            <a:ext cx="864300" cy="374700"/>
-          </a:xfrm>
-          <a:prstGeom prst="rect">
-            <a:avLst/>
-          </a:prstGeom>
-          <a:noFill/>
-          <a:ln>
-            <a:noFill/>
-          </a:ln>
-        </p:spPr>
-        <p:txBody>
-          <a:bodyPr spcFirstLastPara="1" wrap="square" lIns="91425" tIns="91425" rIns="91425" bIns="91425" anchor="t" anchorCtr="0">
-            <a:noAutofit/>
-          </a:bodyPr>
-          <a:lstStyle/>
-          <a:p>
-            <a:pPr marL="0" lvl="0" indent="0" algn="l" rtl="0">
-              <a:spcBef>
-                <a:spcPts val="0"/>
-              </a:spcBef>
-              <a:spcAft>
-                <a:spcPts val="0"/>
-              </a:spcAft>
-              <a:buNone/>
-            </a:pPr>
-            <a:r>
-              <a:rPr lang="en" i="1"/>
-              <a:t>runDFA</a:t>
-            </a:r>
-            <a:endParaRPr i="1"/>
-          </a:p>
-        </p:txBody>
-      </p:sp>
-      <p:sp>
-        <p:nvSpPr>
           <p:cNvPr id="74" name="Google Shape;74;p13"/>
           <p:cNvSpPr/>
           <p:nvPr/>
         </p:nvSpPr>
         <p:spPr>
           <a:xfrm>
-            <a:off x="6272400" y="1710275"/>
+            <a:off x="6271949" y="1615959"/>
             <a:ext cx="980700" cy="748200"/>
           </a:xfrm>
           <a:prstGeom prst="roundRect">
@@ -6735,10 +6610,10 @@
               <a:buNone/>
             </a:pPr>
             <a:r>
-              <a:rPr lang="en"/>
+              <a:rPr lang="en" dirty="0"/>
               <a:t>Compute Letter</a:t>
             </a:r>
-            <a:endParaRPr/>
+            <a:endParaRPr dirty="0"/>
           </a:p>
         </p:txBody>
       </p:sp>
@@ -6750,7 +6625,7 @@
         </p:nvSpPr>
         <p:spPr>
           <a:xfrm>
-            <a:off x="7737050" y="1710275"/>
+            <a:off x="7736599" y="1615959"/>
             <a:ext cx="980700" cy="748200"/>
           </a:xfrm>
           <a:prstGeom prst="roundRect">
@@ -6802,7 +6677,7 @@
         </p:nvSpPr>
         <p:spPr>
           <a:xfrm>
-            <a:off x="7737050" y="2838975"/>
+            <a:off x="7736599" y="2744659"/>
             <a:ext cx="980700" cy="748200"/>
           </a:xfrm>
           <a:prstGeom prst="roundRect">
@@ -6854,7 +6729,7 @@
         </p:nvSpPr>
         <p:spPr>
           <a:xfrm>
-            <a:off x="7295450" y="1989675"/>
+            <a:off x="7294999" y="1895359"/>
             <a:ext cx="404100" cy="189900"/>
           </a:xfrm>
           <a:prstGeom prst="rightArrow">
@@ -6903,7 +6778,7 @@
         </p:nvSpPr>
         <p:spPr>
           <a:xfrm>
-            <a:off x="8163275" y="2483550"/>
+            <a:off x="8162824" y="2389234"/>
             <a:ext cx="197700" cy="313500"/>
           </a:xfrm>
           <a:prstGeom prst="downArrow">
@@ -6980,7 +6855,7 @@
             </a:pPr>
             <a:r>
               <a:rPr lang="en" dirty="0"/>
-              <a:t>This interface should be an array of ports and objects: one event and all the data ports since the data-ports may or may not be relevant to any event.</a:t>
+              <a:t>This interface should be an array of ports and byte arrays: one event and all the data ports since the data-ports may or may not be relevant to any event.</a:t>
             </a:r>
             <a:endParaRPr dirty="0"/>
           </a:p>
@@ -7051,10 +6926,10 @@
               <a:buNone/>
             </a:pPr>
             <a:r>
-              <a:rPr lang="en"/>
-              <a:t>Computes letter from LMCP byte-array and AGREE and output from the same</a:t>
+              <a:rPr lang="en" dirty="0"/>
+              <a:t>Computes letter from byte-array and AGREE and output from the same</a:t>
             </a:r>
-            <a:endParaRPr/>
+            <a:endParaRPr dirty="0"/>
           </a:p>
         </p:txBody>
       </p:sp>
@@ -7101,7 +6976,7 @@
         </p:nvSpPr>
         <p:spPr>
           <a:xfrm>
-            <a:off x="6314750" y="2833697"/>
+            <a:off x="6314299" y="2739381"/>
             <a:ext cx="980700" cy="748200"/>
           </a:xfrm>
           <a:prstGeom prst="roundRect">
@@ -7157,79 +7032,6 @@
               <a:t>Codec</a:t>
             </a:r>
             <a:endParaRPr dirty="0"/>
-          </a:p>
-        </p:txBody>
-      </p:sp>
-      <p:sp>
-        <p:nvSpPr>
-          <p:cNvPr id="32" name="Google Shape;74;p13">
-            <a:extLst>
-              <a:ext uri="{FF2B5EF4-FFF2-40B4-BE49-F238E27FC236}">
-                <a16:creationId xmlns:a16="http://schemas.microsoft.com/office/drawing/2014/main" id="{A54DC05D-8550-ED49-A455-3A61B8987FC9}"/>
-              </a:ext>
-            </a:extLst>
-          </p:cNvPr>
-          <p:cNvSpPr/>
-          <p:nvPr/>
-        </p:nvSpPr>
-        <p:spPr>
-          <a:xfrm>
-            <a:off x="1638624" y="3125871"/>
-            <a:ext cx="674351" cy="546771"/>
-          </a:xfrm>
-          <a:prstGeom prst="roundRect">
-            <a:avLst>
-              <a:gd name="adj" fmla="val 16667"/>
-            </a:avLst>
-          </a:prstGeom>
-          <a:solidFill>
-            <a:srgbClr val="FCE5CD"/>
-          </a:solidFill>
-          <a:ln w="9525" cap="flat" cmpd="sng">
-            <a:solidFill>
-              <a:schemeClr val="dk2"/>
-            </a:solidFill>
-            <a:prstDash val="solid"/>
-            <a:round/>
-            <a:headEnd type="none" w="sm" len="sm"/>
-            <a:tailEnd type="none" w="sm" len="sm"/>
-          </a:ln>
-        </p:spPr>
-        <p:txBody>
-          <a:bodyPr spcFirstLastPara="1" wrap="square" lIns="91425" tIns="91425" rIns="91425" bIns="91425" anchor="ctr" anchorCtr="0">
-            <a:noAutofit/>
-          </a:bodyPr>
-          <a:lstStyle/>
-          <a:p>
-            <a:pPr marL="0" lvl="0" indent="0" algn="ctr" rtl="0">
-              <a:spcBef>
-                <a:spcPts val="0"/>
-              </a:spcBef>
-              <a:spcAft>
-                <a:spcPts val="0"/>
-              </a:spcAft>
-              <a:buNone/>
-            </a:pPr>
-            <a:r>
-              <a:rPr lang="en" sz="1100" dirty="0"/>
-              <a:t>Bit</a:t>
-            </a:r>
-          </a:p>
-          <a:p>
-            <a:pPr marL="0" lvl="0" indent="0" algn="ctr" rtl="0">
-              <a:spcBef>
-                <a:spcPts val="0"/>
-              </a:spcBef>
-              <a:spcAft>
-                <a:spcPts val="0"/>
-              </a:spcAft>
-              <a:buNone/>
-            </a:pPr>
-            <a:r>
-              <a:rPr lang="en" sz="1100" dirty="0"/>
-              <a:t>Codec</a:t>
-            </a:r>
-            <a:endParaRPr sz="1100" dirty="0"/>
           </a:p>
         </p:txBody>
       </p:sp>

</xml_diff>